<commit_message>
mettre tout le background au couleur du fond du logo
</commit_message>
<xml_diff>
--- a/design marquette/orinoco_webdesign_model.pptx
+++ b/design marquette/orinoco_webdesign_model.pptx
@@ -286,7 +286,7 @@
           <a:p>
             <a:fld id="{6D2C2410-16A5-4F12-823D-D10192541280}" type="datetimeFigureOut">
               <a:rPr lang="fr-FR" smtClean="0"/>
-              <a:t>24/07/2021</a:t>
+              <a:t>26/07/2021</a:t>
             </a:fld>
             <a:endParaRPr lang="fr-FR"/>
           </a:p>
@@ -484,7 +484,7 @@
           <a:p>
             <a:fld id="{6D2C2410-16A5-4F12-823D-D10192541280}" type="datetimeFigureOut">
               <a:rPr lang="fr-FR" smtClean="0"/>
-              <a:t>24/07/2021</a:t>
+              <a:t>26/07/2021</a:t>
             </a:fld>
             <a:endParaRPr lang="fr-FR"/>
           </a:p>
@@ -692,7 +692,7 @@
           <a:p>
             <a:fld id="{6D2C2410-16A5-4F12-823D-D10192541280}" type="datetimeFigureOut">
               <a:rPr lang="fr-FR" smtClean="0"/>
-              <a:t>24/07/2021</a:t>
+              <a:t>26/07/2021</a:t>
             </a:fld>
             <a:endParaRPr lang="fr-FR"/>
           </a:p>
@@ -890,7 +890,7 @@
           <a:p>
             <a:fld id="{6D2C2410-16A5-4F12-823D-D10192541280}" type="datetimeFigureOut">
               <a:rPr lang="fr-FR" smtClean="0"/>
-              <a:t>24/07/2021</a:t>
+              <a:t>26/07/2021</a:t>
             </a:fld>
             <a:endParaRPr lang="fr-FR"/>
           </a:p>
@@ -1165,7 +1165,7 @@
           <a:p>
             <a:fld id="{6D2C2410-16A5-4F12-823D-D10192541280}" type="datetimeFigureOut">
               <a:rPr lang="fr-FR" smtClean="0"/>
-              <a:t>24/07/2021</a:t>
+              <a:t>26/07/2021</a:t>
             </a:fld>
             <a:endParaRPr lang="fr-FR"/>
           </a:p>
@@ -1430,7 +1430,7 @@
           <a:p>
             <a:fld id="{6D2C2410-16A5-4F12-823D-D10192541280}" type="datetimeFigureOut">
               <a:rPr lang="fr-FR" smtClean="0"/>
-              <a:t>24/07/2021</a:t>
+              <a:t>26/07/2021</a:t>
             </a:fld>
             <a:endParaRPr lang="fr-FR"/>
           </a:p>
@@ -1842,7 +1842,7 @@
           <a:p>
             <a:fld id="{6D2C2410-16A5-4F12-823D-D10192541280}" type="datetimeFigureOut">
               <a:rPr lang="fr-FR" smtClean="0"/>
-              <a:t>24/07/2021</a:t>
+              <a:t>26/07/2021</a:t>
             </a:fld>
             <a:endParaRPr lang="fr-FR"/>
           </a:p>
@@ -1983,7 +1983,7 @@
           <a:p>
             <a:fld id="{6D2C2410-16A5-4F12-823D-D10192541280}" type="datetimeFigureOut">
               <a:rPr lang="fr-FR" smtClean="0"/>
-              <a:t>24/07/2021</a:t>
+              <a:t>26/07/2021</a:t>
             </a:fld>
             <a:endParaRPr lang="fr-FR"/>
           </a:p>
@@ -2096,7 +2096,7 @@
           <a:p>
             <a:fld id="{6D2C2410-16A5-4F12-823D-D10192541280}" type="datetimeFigureOut">
               <a:rPr lang="fr-FR" smtClean="0"/>
-              <a:t>24/07/2021</a:t>
+              <a:t>26/07/2021</a:t>
             </a:fld>
             <a:endParaRPr lang="fr-FR"/>
           </a:p>
@@ -2407,7 +2407,7 @@
           <a:p>
             <a:fld id="{6D2C2410-16A5-4F12-823D-D10192541280}" type="datetimeFigureOut">
               <a:rPr lang="fr-FR" smtClean="0"/>
-              <a:t>24/07/2021</a:t>
+              <a:t>26/07/2021</a:t>
             </a:fld>
             <a:endParaRPr lang="fr-FR"/>
           </a:p>
@@ -2695,7 +2695,7 @@
           <a:p>
             <a:fld id="{6D2C2410-16A5-4F12-823D-D10192541280}" type="datetimeFigureOut">
               <a:rPr lang="fr-FR" smtClean="0"/>
-              <a:t>24/07/2021</a:t>
+              <a:t>26/07/2021</a:t>
             </a:fld>
             <a:endParaRPr lang="fr-FR"/>
           </a:p>
@@ -2936,7 +2936,7 @@
           <a:p>
             <a:fld id="{6D2C2410-16A5-4F12-823D-D10192541280}" type="datetimeFigureOut">
               <a:rPr lang="fr-FR" smtClean="0"/>
-              <a:t>24/07/2021</a:t>
+              <a:t>26/07/2021</a:t>
             </a:fld>
             <a:endParaRPr lang="fr-FR"/>
           </a:p>
@@ -3685,14 +3685,7 @@
           <a:p>
             <a:pPr algn="ctr"/>
             <a:r>
-              <a:rPr lang="fr-FR" sz="2400" b="1" i="1" dirty="0">
-                <a:solidFill>
-                  <a:schemeClr val="tx1">
-                    <a:lumMod val="65000"/>
-                    <a:lumOff val="35000"/>
-                  </a:schemeClr>
-                </a:solidFill>
-              </a:rPr>
+              <a:rPr lang="fr-FR" sz="2400" b="1" i="1" dirty="0"/>
               <a:t>Tous nos ours en peluche sont faits à la main et personnalisable</a:t>
             </a:r>
           </a:p>
@@ -3728,18 +3721,10 @@
           <a:p>
             <a:pPr algn="ctr"/>
             <a:r>
-              <a:rPr lang="fr-FR" sz="1400" dirty="0" err="1">
-                <a:solidFill>
-                  <a:srgbClr val="7030A0"/>
-                </a:solidFill>
-              </a:rPr>
+              <a:rPr lang="fr-FR" sz="1400" b="1" dirty="0" err="1"/>
               <a:t>Toubisou</a:t>
             </a:r>
-            <a:endParaRPr lang="fr-FR" sz="1400" dirty="0">
-              <a:solidFill>
-                <a:srgbClr val="7030A0"/>
-              </a:solidFill>
-            </a:endParaRPr>
+            <a:endParaRPr lang="fr-FR" sz="1400" b="1" dirty="0"/>
           </a:p>
         </p:txBody>
       </p:sp>
@@ -3773,18 +3758,10 @@
           <a:p>
             <a:pPr algn="ctr"/>
             <a:r>
-              <a:rPr lang="fr-FR" sz="1400" dirty="0" err="1">
-                <a:solidFill>
-                  <a:srgbClr val="7030A0"/>
-                </a:solidFill>
-              </a:rPr>
+              <a:rPr lang="fr-FR" sz="1400" b="1" dirty="0" err="1"/>
               <a:t>Toumignon</a:t>
             </a:r>
-            <a:endParaRPr lang="fr-FR" sz="1400" dirty="0">
-              <a:solidFill>
-                <a:srgbClr val="7030A0"/>
-              </a:solidFill>
-            </a:endParaRPr>
+            <a:endParaRPr lang="fr-FR" sz="1400" b="1" dirty="0"/>
           </a:p>
         </p:txBody>
       </p:sp>
@@ -3818,18 +3795,10 @@
           <a:p>
             <a:pPr algn="ctr"/>
             <a:r>
-              <a:rPr lang="fr-FR" sz="1400" dirty="0" err="1">
-                <a:solidFill>
-                  <a:srgbClr val="7030A0"/>
-                </a:solidFill>
-              </a:rPr>
+              <a:rPr lang="fr-FR" sz="1400" b="1" dirty="0" err="1"/>
               <a:t>Toucalin</a:t>
             </a:r>
-            <a:endParaRPr lang="fr-FR" sz="1400" dirty="0">
-              <a:solidFill>
-                <a:srgbClr val="7030A0"/>
-              </a:solidFill>
-            </a:endParaRPr>
+            <a:endParaRPr lang="fr-FR" sz="1400" b="1" dirty="0"/>
           </a:p>
         </p:txBody>
       </p:sp>
@@ -3863,18 +3832,10 @@
           <a:p>
             <a:pPr algn="ctr"/>
             <a:r>
-              <a:rPr lang="fr-FR" sz="1400" dirty="0" err="1">
-                <a:solidFill>
-                  <a:srgbClr val="7030A0"/>
-                </a:solidFill>
-              </a:rPr>
+              <a:rPr lang="fr-FR" sz="1400" b="1" dirty="0" err="1"/>
               <a:t>Tougentil</a:t>
             </a:r>
-            <a:endParaRPr lang="fr-FR" sz="1400" dirty="0">
-              <a:solidFill>
-                <a:srgbClr val="7030A0"/>
-              </a:solidFill>
-            </a:endParaRPr>
+            <a:endParaRPr lang="fr-FR" sz="1400" b="1" dirty="0"/>
           </a:p>
         </p:txBody>
       </p:sp>
@@ -3908,18 +3869,10 @@
           <a:p>
             <a:pPr algn="ctr"/>
             <a:r>
-              <a:rPr lang="fr-FR" sz="1400" dirty="0" err="1">
-                <a:solidFill>
-                  <a:srgbClr val="7030A0"/>
-                </a:solidFill>
-              </a:rPr>
+              <a:rPr lang="fr-FR" sz="1400" b="1" dirty="0" err="1"/>
               <a:t>Touseul</a:t>
             </a:r>
-            <a:endParaRPr lang="fr-FR" sz="1400" dirty="0">
-              <a:solidFill>
-                <a:srgbClr val="7030A0"/>
-              </a:solidFill>
-            </a:endParaRPr>
+            <a:endParaRPr lang="fr-FR" sz="1400" b="1" dirty="0"/>
           </a:p>
         </p:txBody>
       </p:sp>
@@ -4141,25 +4094,11 @@
           <a:lstStyle/>
           <a:p>
             <a:r>
-              <a:rPr lang="fr-FR" b="1" dirty="0" err="1">
-                <a:solidFill>
-                  <a:schemeClr val="tx1">
-                    <a:lumMod val="65000"/>
-                    <a:lumOff val="35000"/>
-                  </a:schemeClr>
-                </a:solidFill>
-              </a:rPr>
+              <a:rPr lang="fr-FR" b="1" dirty="0" err="1"/>
               <a:t>Oribear</a:t>
             </a:r>
             <a:r>
-              <a:rPr lang="fr-FR" dirty="0">
-                <a:solidFill>
-                  <a:schemeClr val="tx1">
-                    <a:lumMod val="65000"/>
-                    <a:lumOff val="35000"/>
-                  </a:schemeClr>
-                </a:solidFill>
-              </a:rPr>
+              <a:rPr lang="fr-FR" dirty="0"/>
               <a:t> l’univers des ours en peluche</a:t>
             </a:r>
           </a:p>

</xml_diff>

<commit_message>
Page accueil avec index.js
</commit_message>
<xml_diff>
--- a/design marquette/orinoco_webdesign_model.pptx
+++ b/design marquette/orinoco_webdesign_model.pptx
@@ -287,7 +287,7 @@
           <a:p>
             <a:fld id="{6D2C2410-16A5-4F12-823D-D10192541280}" type="datetimeFigureOut">
               <a:rPr lang="fr-FR" smtClean="0"/>
-              <a:t>28/07/2021</a:t>
+              <a:t>30/07/2021</a:t>
             </a:fld>
             <a:endParaRPr lang="fr-FR"/>
           </a:p>
@@ -485,7 +485,7 @@
           <a:p>
             <a:fld id="{6D2C2410-16A5-4F12-823D-D10192541280}" type="datetimeFigureOut">
               <a:rPr lang="fr-FR" smtClean="0"/>
-              <a:t>28/07/2021</a:t>
+              <a:t>30/07/2021</a:t>
             </a:fld>
             <a:endParaRPr lang="fr-FR"/>
           </a:p>
@@ -693,7 +693,7 @@
           <a:p>
             <a:fld id="{6D2C2410-16A5-4F12-823D-D10192541280}" type="datetimeFigureOut">
               <a:rPr lang="fr-FR" smtClean="0"/>
-              <a:t>28/07/2021</a:t>
+              <a:t>30/07/2021</a:t>
             </a:fld>
             <a:endParaRPr lang="fr-FR"/>
           </a:p>
@@ -891,7 +891,7 @@
           <a:p>
             <a:fld id="{6D2C2410-16A5-4F12-823D-D10192541280}" type="datetimeFigureOut">
               <a:rPr lang="fr-FR" smtClean="0"/>
-              <a:t>28/07/2021</a:t>
+              <a:t>30/07/2021</a:t>
             </a:fld>
             <a:endParaRPr lang="fr-FR"/>
           </a:p>
@@ -1166,7 +1166,7 @@
           <a:p>
             <a:fld id="{6D2C2410-16A5-4F12-823D-D10192541280}" type="datetimeFigureOut">
               <a:rPr lang="fr-FR" smtClean="0"/>
-              <a:t>28/07/2021</a:t>
+              <a:t>30/07/2021</a:t>
             </a:fld>
             <a:endParaRPr lang="fr-FR"/>
           </a:p>
@@ -1431,7 +1431,7 @@
           <a:p>
             <a:fld id="{6D2C2410-16A5-4F12-823D-D10192541280}" type="datetimeFigureOut">
               <a:rPr lang="fr-FR" smtClean="0"/>
-              <a:t>28/07/2021</a:t>
+              <a:t>30/07/2021</a:t>
             </a:fld>
             <a:endParaRPr lang="fr-FR"/>
           </a:p>
@@ -1843,7 +1843,7 @@
           <a:p>
             <a:fld id="{6D2C2410-16A5-4F12-823D-D10192541280}" type="datetimeFigureOut">
               <a:rPr lang="fr-FR" smtClean="0"/>
-              <a:t>28/07/2021</a:t>
+              <a:t>30/07/2021</a:t>
             </a:fld>
             <a:endParaRPr lang="fr-FR"/>
           </a:p>
@@ -1984,7 +1984,7 @@
           <a:p>
             <a:fld id="{6D2C2410-16A5-4F12-823D-D10192541280}" type="datetimeFigureOut">
               <a:rPr lang="fr-FR" smtClean="0"/>
-              <a:t>28/07/2021</a:t>
+              <a:t>30/07/2021</a:t>
             </a:fld>
             <a:endParaRPr lang="fr-FR"/>
           </a:p>
@@ -2097,7 +2097,7 @@
           <a:p>
             <a:fld id="{6D2C2410-16A5-4F12-823D-D10192541280}" type="datetimeFigureOut">
               <a:rPr lang="fr-FR" smtClean="0"/>
-              <a:t>28/07/2021</a:t>
+              <a:t>30/07/2021</a:t>
             </a:fld>
             <a:endParaRPr lang="fr-FR"/>
           </a:p>
@@ -2408,7 +2408,7 @@
           <a:p>
             <a:fld id="{6D2C2410-16A5-4F12-823D-D10192541280}" type="datetimeFigureOut">
               <a:rPr lang="fr-FR" smtClean="0"/>
-              <a:t>28/07/2021</a:t>
+              <a:t>30/07/2021</a:t>
             </a:fld>
             <a:endParaRPr lang="fr-FR"/>
           </a:p>
@@ -2696,7 +2696,7 @@
           <a:p>
             <a:fld id="{6D2C2410-16A5-4F12-823D-D10192541280}" type="datetimeFigureOut">
               <a:rPr lang="fr-FR" smtClean="0"/>
-              <a:t>28/07/2021</a:t>
+              <a:t>30/07/2021</a:t>
             </a:fld>
             <a:endParaRPr lang="fr-FR"/>
           </a:p>
@@ -2937,7 +2937,7 @@
           <a:p>
             <a:fld id="{6D2C2410-16A5-4F12-823D-D10192541280}" type="datetimeFigureOut">
               <a:rPr lang="fr-FR" smtClean="0"/>
-              <a:t>28/07/2021</a:t>
+              <a:t>30/07/2021</a:t>
             </a:fld>
             <a:endParaRPr lang="fr-FR"/>
           </a:p>
@@ -4350,7 +4350,7 @@
                   <a:srgbClr val="7030A0"/>
                 </a:solidFill>
               </a:rPr>
-              <a:t>Civilité</a:t>
+              <a:t>Nom</a:t>
             </a:r>
           </a:p>
         </p:txBody>
@@ -4616,7 +4616,7 @@
                   <a:srgbClr val="7030A0"/>
                 </a:solidFill>
               </a:rPr>
-              <a:t>Nom</a:t>
+              <a:t>Prénom</a:t>
             </a:r>
           </a:p>
         </p:txBody>
@@ -4761,7 +4761,7 @@
                   <a:srgbClr val="7030A0"/>
                 </a:solidFill>
               </a:rPr>
-              <a:t>Prénom</a:t>
+              <a:t>Email</a:t>
             </a:r>
           </a:p>
         </p:txBody>
@@ -4853,7 +4853,7 @@
                   <a:srgbClr val="7030A0"/>
                 </a:solidFill>
               </a:rPr>
-              <a:t>Email</a:t>
+              <a:t>Message</a:t>
             </a:r>
           </a:p>
         </p:txBody>
@@ -4873,99 +4873,7 @@
         <p:spPr>
           <a:xfrm>
             <a:off x="4556726" y="3177923"/>
-            <a:ext cx="4393310" cy="436589"/>
-          </a:xfrm>
-          <a:prstGeom prst="roundRect">
-            <a:avLst/>
-          </a:prstGeom>
-          <a:solidFill>
-            <a:srgbClr val="F3E9F1"/>
-          </a:solidFill>
-        </p:spPr>
-        <p:style>
-          <a:lnRef idx="2">
-            <a:schemeClr val="accent1">
-              <a:shade val="50000"/>
-            </a:schemeClr>
-          </a:lnRef>
-          <a:fillRef idx="1">
-            <a:schemeClr val="accent1"/>
-          </a:fillRef>
-          <a:effectRef idx="0">
-            <a:schemeClr val="accent1"/>
-          </a:effectRef>
-          <a:fontRef idx="minor">
-            <a:schemeClr val="lt1"/>
-          </a:fontRef>
-        </p:style>
-        <p:txBody>
-          <a:bodyPr rtlCol="0" anchor="ctr"/>
-          <a:lstStyle/>
-          <a:p>
-            <a:pPr algn="ctr"/>
-            <a:endParaRPr lang="fr-FR" sz="1800" dirty="0">
-              <a:solidFill>
-                <a:srgbClr val="7030A0"/>
-              </a:solidFill>
-            </a:endParaRPr>
-          </a:p>
-        </p:txBody>
-      </p:sp>
-      <p:sp>
-        <p:nvSpPr>
-          <p:cNvPr id="79" name="ZoneTexte 78">
-            <a:extLst>
-              <a:ext uri="{FF2B5EF4-FFF2-40B4-BE49-F238E27FC236}">
-                <a16:creationId xmlns:a16="http://schemas.microsoft.com/office/drawing/2014/main" id="{8F6D4638-BF84-4DD6-A596-3F8F9A0CAF5A}"/>
-              </a:ext>
-            </a:extLst>
-          </p:cNvPr>
-          <p:cNvSpPr txBox="1"/>
-          <p:nvPr/>
-        </p:nvSpPr>
-        <p:spPr>
-          <a:xfrm>
-            <a:off x="3067433" y="3718934"/>
-            <a:ext cx="1377094" cy="369332"/>
-          </a:xfrm>
-          <a:prstGeom prst="rect">
-            <a:avLst/>
-          </a:prstGeom>
-          <a:noFill/>
-        </p:spPr>
-        <p:txBody>
-          <a:bodyPr wrap="square" rtlCol="0">
-            <a:spAutoFit/>
-          </a:bodyPr>
-          <a:lstStyle/>
-          <a:p>
-            <a:r>
-              <a:rPr lang="fr-FR" b="1" dirty="0">
-                <a:solidFill>
-                  <a:srgbClr val="7030A0"/>
-                </a:solidFill>
-              </a:rPr>
-              <a:t>Message</a:t>
-            </a:r>
-          </a:p>
-        </p:txBody>
-      </p:sp>
-      <p:sp>
-        <p:nvSpPr>
-          <p:cNvPr id="81" name="Rectangle : coins arrondis 80">
-            <a:extLst>
-              <a:ext uri="{FF2B5EF4-FFF2-40B4-BE49-F238E27FC236}">
-                <a16:creationId xmlns:a16="http://schemas.microsoft.com/office/drawing/2014/main" id="{E7A91C03-8900-45CE-92D4-9799CA8635C7}"/>
-              </a:ext>
-            </a:extLst>
-          </p:cNvPr>
-          <p:cNvSpPr/>
-          <p:nvPr/>
-        </p:nvSpPr>
-        <p:spPr>
-          <a:xfrm>
-            <a:off x="4553026" y="3730576"/>
-            <a:ext cx="4393310" cy="1130868"/>
+            <a:ext cx="4393310" cy="1578724"/>
           </a:xfrm>
           <a:prstGeom prst="roundRect">
             <a:avLst/>

</xml_diff>